<commit_message>
many changes to webpages fixed problem in convex hull for links when 2 points on top of each other fixed lots of bugs associated with PPP links added special cases to DOF check (Gruebler's is not enough!)
</commit_message>
<xml_diff>
--- a/webpages/figures.pptx
+++ b/webpages/figures.pptx
@@ -12,6 +12,11 @@
     <p:sldId id="260" r:id="rId6"/>
     <p:sldId id="261" r:id="rId7"/>
     <p:sldId id="262" r:id="rId8"/>
+    <p:sldId id="263" r:id="rId9"/>
+    <p:sldId id="264" r:id="rId10"/>
+    <p:sldId id="265" r:id="rId11"/>
+    <p:sldId id="266" r:id="rId12"/>
+    <p:sldId id="267" r:id="rId13"/>
   </p:sldIdLst>
   <p:sldSz cx="12192000" cy="6858000"/>
   <p:notesSz cx="6858000" cy="9144000"/>
@@ -249,7 +254,7 @@
           <a:p>
             <a:fld id="{E823C624-9284-4A87-8262-D7FD0E50FAEE}" type="datetimeFigureOut">
               <a:rPr lang="en-US" smtClean="0"/>
-              <a:t>3/27/2014</a:t>
+              <a:t>4/1/2014</a:t>
             </a:fld>
             <a:endParaRPr lang="en-US"/>
           </a:p>
@@ -419,7 +424,7 @@
           <a:p>
             <a:fld id="{E823C624-9284-4A87-8262-D7FD0E50FAEE}" type="datetimeFigureOut">
               <a:rPr lang="en-US" smtClean="0"/>
-              <a:t>3/27/2014</a:t>
+              <a:t>4/1/2014</a:t>
             </a:fld>
             <a:endParaRPr lang="en-US"/>
           </a:p>
@@ -599,7 +604,7 @@
           <a:p>
             <a:fld id="{E823C624-9284-4A87-8262-D7FD0E50FAEE}" type="datetimeFigureOut">
               <a:rPr lang="en-US" smtClean="0"/>
-              <a:t>3/27/2014</a:t>
+              <a:t>4/1/2014</a:t>
             </a:fld>
             <a:endParaRPr lang="en-US"/>
           </a:p>
@@ -769,7 +774,7 @@
           <a:p>
             <a:fld id="{E823C624-9284-4A87-8262-D7FD0E50FAEE}" type="datetimeFigureOut">
               <a:rPr lang="en-US" smtClean="0"/>
-              <a:t>3/27/2014</a:t>
+              <a:t>4/1/2014</a:t>
             </a:fld>
             <a:endParaRPr lang="en-US"/>
           </a:p>
@@ -1015,7 +1020,7 @@
           <a:p>
             <a:fld id="{E823C624-9284-4A87-8262-D7FD0E50FAEE}" type="datetimeFigureOut">
               <a:rPr lang="en-US" smtClean="0"/>
-              <a:t>3/27/2014</a:t>
+              <a:t>4/1/2014</a:t>
             </a:fld>
             <a:endParaRPr lang="en-US"/>
           </a:p>
@@ -1247,7 +1252,7 @@
           <a:p>
             <a:fld id="{E823C624-9284-4A87-8262-D7FD0E50FAEE}" type="datetimeFigureOut">
               <a:rPr lang="en-US" smtClean="0"/>
-              <a:t>3/27/2014</a:t>
+              <a:t>4/1/2014</a:t>
             </a:fld>
             <a:endParaRPr lang="en-US"/>
           </a:p>
@@ -1614,7 +1619,7 @@
           <a:p>
             <a:fld id="{E823C624-9284-4A87-8262-D7FD0E50FAEE}" type="datetimeFigureOut">
               <a:rPr lang="en-US" smtClean="0"/>
-              <a:t>3/27/2014</a:t>
+              <a:t>4/1/2014</a:t>
             </a:fld>
             <a:endParaRPr lang="en-US"/>
           </a:p>
@@ -1732,7 +1737,7 @@
           <a:p>
             <a:fld id="{E823C624-9284-4A87-8262-D7FD0E50FAEE}" type="datetimeFigureOut">
               <a:rPr lang="en-US" smtClean="0"/>
-              <a:t>3/27/2014</a:t>
+              <a:t>4/1/2014</a:t>
             </a:fld>
             <a:endParaRPr lang="en-US"/>
           </a:p>
@@ -1827,7 +1832,7 @@
           <a:p>
             <a:fld id="{E823C624-9284-4A87-8262-D7FD0E50FAEE}" type="datetimeFigureOut">
               <a:rPr lang="en-US" smtClean="0"/>
-              <a:t>3/27/2014</a:t>
+              <a:t>4/1/2014</a:t>
             </a:fld>
             <a:endParaRPr lang="en-US"/>
           </a:p>
@@ -2104,7 +2109,7 @@
           <a:p>
             <a:fld id="{E823C624-9284-4A87-8262-D7FD0E50FAEE}" type="datetimeFigureOut">
               <a:rPr lang="en-US" smtClean="0"/>
-              <a:t>3/27/2014</a:t>
+              <a:t>4/1/2014</a:t>
             </a:fld>
             <a:endParaRPr lang="en-US"/>
           </a:p>
@@ -2357,7 +2362,7 @@
           <a:p>
             <a:fld id="{E823C624-9284-4A87-8262-D7FD0E50FAEE}" type="datetimeFigureOut">
               <a:rPr lang="en-US" smtClean="0"/>
-              <a:t>3/27/2014</a:t>
+              <a:t>4/1/2014</a:t>
             </a:fld>
             <a:endParaRPr lang="en-US"/>
           </a:p>
@@ -2570,7 +2575,7 @@
           <a:p>
             <a:fld id="{E823C624-9284-4A87-8262-D7FD0E50FAEE}" type="datetimeFigureOut">
               <a:rPr lang="en-US" smtClean="0"/>
-              <a:t>3/27/2014</a:t>
+              <a:t>4/1/2014</a:t>
             </a:fld>
             <a:endParaRPr lang="en-US"/>
           </a:p>
@@ -3655,6 +3660,321 @@
       </p:par>
     </p:tnLst>
   </p:timing>
+</p:sld>
+</file>
+
+<file path=ppt/slides/slide10.xml><?xml version="1.0" encoding="utf-8"?>
+<p:sld xmlns:a="http://schemas.openxmlformats.org/drawingml/2006/main" xmlns:r="http://schemas.openxmlformats.org/officeDocument/2006/relationships" xmlns:p="http://schemas.openxmlformats.org/presentationml/2006/main">
+  <p:cSld>
+    <p:spTree>
+      <p:nvGrpSpPr>
+        <p:cNvPr id="1" name=""/>
+        <p:cNvGrpSpPr/>
+        <p:nvPr/>
+      </p:nvGrpSpPr>
+      <p:grpSpPr>
+        <a:xfrm>
+          <a:off x="0" y="0"/>
+          <a:ext cx="0" cy="0"/>
+          <a:chOff x="0" y="0"/>
+          <a:chExt cx="0" cy="0"/>
+        </a:xfrm>
+      </p:grpSpPr>
+      <p:pic>
+        <p:nvPicPr>
+          <p:cNvPr id="2" name="Picture 1"/>
+          <p:cNvPicPr>
+            <a:picLocks noChangeAspect="1"/>
+          </p:cNvPicPr>
+          <p:nvPr/>
+        </p:nvPicPr>
+        <p:blipFill rotWithShape="1">
+          <a:blip r:embed="rId2" cstate="email">
+            <a:extLst>
+              <a:ext uri="{28A0092B-C50C-407E-A947-70E740481C1C}">
+                <a14:useLocalDpi xmlns:a14="http://schemas.microsoft.com/office/drawing/2010/main"/>
+              </a:ext>
+            </a:extLst>
+          </a:blip>
+          <a:srcRect/>
+          <a:stretch/>
+        </p:blipFill>
+        <p:spPr>
+          <a:xfrm>
+            <a:off x="609601" y="1277257"/>
+            <a:ext cx="7112000" cy="2290174"/>
+          </a:xfrm>
+          <a:prstGeom prst="rect">
+            <a:avLst/>
+          </a:prstGeom>
+        </p:spPr>
+      </p:pic>
+    </p:spTree>
+    <p:extLst>
+      <p:ext uri="{BB962C8B-B14F-4D97-AF65-F5344CB8AC3E}">
+        <p14:creationId xmlns:p14="http://schemas.microsoft.com/office/powerpoint/2010/main" val="1881860627"/>
+      </p:ext>
+    </p:extLst>
+  </p:cSld>
+  <p:clrMapOvr>
+    <a:masterClrMapping/>
+  </p:clrMapOvr>
+</p:sld>
+</file>
+
+<file path=ppt/slides/slide11.xml><?xml version="1.0" encoding="utf-8"?>
+<p:sld xmlns:a="http://schemas.openxmlformats.org/drawingml/2006/main" xmlns:r="http://schemas.openxmlformats.org/officeDocument/2006/relationships" xmlns:p="http://schemas.openxmlformats.org/presentationml/2006/main">
+  <p:cSld>
+    <p:spTree>
+      <p:nvGrpSpPr>
+        <p:cNvPr id="1" name=""/>
+        <p:cNvGrpSpPr/>
+        <p:nvPr/>
+      </p:nvGrpSpPr>
+      <p:grpSpPr>
+        <a:xfrm>
+          <a:off x="0" y="0"/>
+          <a:ext cx="0" cy="0"/>
+          <a:chOff x="0" y="0"/>
+          <a:chExt cx="0" cy="0"/>
+        </a:xfrm>
+      </p:grpSpPr>
+      <p:pic>
+        <p:nvPicPr>
+          <p:cNvPr id="2" name="Picture 1"/>
+          <p:cNvPicPr>
+            <a:picLocks noChangeAspect="1"/>
+          </p:cNvPicPr>
+          <p:nvPr/>
+        </p:nvPicPr>
+        <p:blipFill rotWithShape="1">
+          <a:blip r:embed="rId2"/>
+          <a:srcRect l="10238" t="36337" r="62937" b="17362"/>
+          <a:stretch/>
+        </p:blipFill>
+        <p:spPr>
+          <a:xfrm>
+            <a:off x="159656" y="1048656"/>
+            <a:ext cx="4905829" cy="4586515"/>
+          </a:xfrm>
+          <a:prstGeom prst="rect">
+            <a:avLst/>
+          </a:prstGeom>
+        </p:spPr>
+      </p:pic>
+      <p:sp>
+        <p:nvSpPr>
+          <p:cNvPr id="5" name="Oval 4"/>
+          <p:cNvSpPr/>
+          <p:nvPr/>
+        </p:nvSpPr>
+        <p:spPr>
+          <a:xfrm>
+            <a:off x="159656" y="3628570"/>
+            <a:ext cx="4238171" cy="1262743"/>
+          </a:xfrm>
+          <a:prstGeom prst="ellipse">
+            <a:avLst/>
+          </a:prstGeom>
+          <a:noFill/>
+          <a:ln w="57150">
+            <a:solidFill>
+              <a:srgbClr val="FF0000"/>
+            </a:solidFill>
+          </a:ln>
+        </p:spPr>
+        <p:style>
+          <a:lnRef idx="2">
+            <a:schemeClr val="accent1">
+              <a:shade val="50000"/>
+            </a:schemeClr>
+          </a:lnRef>
+          <a:fillRef idx="1">
+            <a:schemeClr val="accent1"/>
+          </a:fillRef>
+          <a:effectRef idx="0">
+            <a:schemeClr val="accent1"/>
+          </a:effectRef>
+          <a:fontRef idx="minor">
+            <a:schemeClr val="lt1"/>
+          </a:fontRef>
+        </p:style>
+        <p:txBody>
+          <a:bodyPr rtlCol="0" anchor="ctr"/>
+          <a:lstStyle/>
+          <a:p>
+            <a:pPr algn="ctr"/>
+            <a:endParaRPr lang="en-US"/>
+          </a:p>
+        </p:txBody>
+      </p:sp>
+      <p:pic>
+        <p:nvPicPr>
+          <p:cNvPr id="8" name="Picture 7"/>
+          <p:cNvPicPr>
+            <a:picLocks noChangeAspect="1"/>
+          </p:cNvPicPr>
+          <p:nvPr/>
+        </p:nvPicPr>
+        <p:blipFill rotWithShape="1">
+          <a:blip r:embed="rId3"/>
+          <a:srcRect l="10397" t="36337" r="62857" b="18827"/>
+          <a:stretch/>
+        </p:blipFill>
+        <p:spPr>
+          <a:xfrm>
+            <a:off x="6487886" y="1048656"/>
+            <a:ext cx="4891314" cy="4441372"/>
+          </a:xfrm>
+          <a:prstGeom prst="rect">
+            <a:avLst/>
+          </a:prstGeom>
+        </p:spPr>
+      </p:pic>
+      <p:sp>
+        <p:nvSpPr>
+          <p:cNvPr id="9" name="Oval 8"/>
+          <p:cNvSpPr/>
+          <p:nvPr/>
+        </p:nvSpPr>
+        <p:spPr>
+          <a:xfrm>
+            <a:off x="6487886" y="3628571"/>
+            <a:ext cx="4238171" cy="1262743"/>
+          </a:xfrm>
+          <a:prstGeom prst="ellipse">
+            <a:avLst/>
+          </a:prstGeom>
+          <a:noFill/>
+          <a:ln w="57150">
+            <a:solidFill>
+              <a:srgbClr val="FF0000"/>
+            </a:solidFill>
+          </a:ln>
+        </p:spPr>
+        <p:style>
+          <a:lnRef idx="2">
+            <a:schemeClr val="accent1">
+              <a:shade val="50000"/>
+            </a:schemeClr>
+          </a:lnRef>
+          <a:fillRef idx="1">
+            <a:schemeClr val="accent1"/>
+          </a:fillRef>
+          <a:effectRef idx="0">
+            <a:schemeClr val="accent1"/>
+          </a:effectRef>
+          <a:fontRef idx="minor">
+            <a:schemeClr val="lt1"/>
+          </a:fontRef>
+        </p:style>
+        <p:txBody>
+          <a:bodyPr rtlCol="0" anchor="ctr"/>
+          <a:lstStyle/>
+          <a:p>
+            <a:pPr algn="ctr"/>
+            <a:endParaRPr lang="en-US"/>
+          </a:p>
+        </p:txBody>
+      </p:sp>
+    </p:spTree>
+    <p:extLst>
+      <p:ext uri="{BB962C8B-B14F-4D97-AF65-F5344CB8AC3E}">
+        <p14:creationId xmlns:p14="http://schemas.microsoft.com/office/powerpoint/2010/main" val="2386974369"/>
+      </p:ext>
+    </p:extLst>
+  </p:cSld>
+  <p:clrMapOvr>
+    <a:masterClrMapping/>
+  </p:clrMapOvr>
+</p:sld>
+</file>
+
+<file path=ppt/slides/slide12.xml><?xml version="1.0" encoding="utf-8"?>
+<p:sld xmlns:a="http://schemas.openxmlformats.org/drawingml/2006/main" xmlns:r="http://schemas.openxmlformats.org/officeDocument/2006/relationships" xmlns:p="http://schemas.openxmlformats.org/presentationml/2006/main">
+  <p:cSld>
+    <p:spTree>
+      <p:nvGrpSpPr>
+        <p:cNvPr id="1" name=""/>
+        <p:cNvGrpSpPr/>
+        <p:nvPr/>
+      </p:nvGrpSpPr>
+      <p:grpSpPr>
+        <a:xfrm>
+          <a:off x="0" y="0"/>
+          <a:ext cx="0" cy="0"/>
+          <a:chOff x="0" y="0"/>
+          <a:chExt cx="0" cy="0"/>
+        </a:xfrm>
+      </p:grpSpPr>
+      <p:pic>
+        <p:nvPicPr>
+          <p:cNvPr id="4" name="Picture 3"/>
+          <p:cNvPicPr>
+            <a:picLocks noChangeAspect="1"/>
+          </p:cNvPicPr>
+          <p:nvPr/>
+        </p:nvPicPr>
+        <p:blipFill rotWithShape="1">
+          <a:blip r:embed="rId2" cstate="email">
+            <a:extLst>
+              <a:ext uri="{28A0092B-C50C-407E-A947-70E740481C1C}">
+                <a14:useLocalDpi xmlns:a14="http://schemas.microsoft.com/office/drawing/2010/main"/>
+              </a:ext>
+            </a:extLst>
+          </a:blip>
+          <a:srcRect/>
+          <a:stretch/>
+        </p:blipFill>
+        <p:spPr>
+          <a:xfrm>
+            <a:off x="4282500" y="980006"/>
+            <a:ext cx="2606032" cy="2298654"/>
+          </a:xfrm>
+          <a:prstGeom prst="rect">
+            <a:avLst/>
+          </a:prstGeom>
+        </p:spPr>
+      </p:pic>
+      <p:pic>
+        <p:nvPicPr>
+          <p:cNvPr id="5" name="Picture 4"/>
+          <p:cNvPicPr>
+            <a:picLocks noChangeAspect="1"/>
+          </p:cNvPicPr>
+          <p:nvPr/>
+        </p:nvPicPr>
+        <p:blipFill rotWithShape="1">
+          <a:blip r:embed="rId3" cstate="email">
+            <a:extLst>
+              <a:ext uri="{28A0092B-C50C-407E-A947-70E740481C1C}">
+                <a14:useLocalDpi xmlns:a14="http://schemas.microsoft.com/office/drawing/2010/main"/>
+              </a:ext>
+            </a:extLst>
+          </a:blip>
+          <a:srcRect/>
+          <a:stretch/>
+        </p:blipFill>
+        <p:spPr>
+          <a:xfrm>
+            <a:off x="1590012" y="1021220"/>
+            <a:ext cx="2479480" cy="2356294"/>
+          </a:xfrm>
+          <a:prstGeom prst="rect">
+            <a:avLst/>
+          </a:prstGeom>
+        </p:spPr>
+      </p:pic>
+    </p:spTree>
+    <p:extLst>
+      <p:ext uri="{BB962C8B-B14F-4D97-AF65-F5344CB8AC3E}">
+        <p14:creationId xmlns:p14="http://schemas.microsoft.com/office/powerpoint/2010/main" val="2095865465"/>
+      </p:ext>
+    </p:extLst>
+  </p:cSld>
+  <p:clrMapOvr>
+    <a:masterClrMapping/>
+  </p:clrMapOvr>
 </p:sld>
 </file>
 
@@ -4871,6 +5191,182 @@
 </p:sld>
 </file>
 
+<file path=ppt/slides/slide8.xml><?xml version="1.0" encoding="utf-8"?>
+<p:sld xmlns:a="http://schemas.openxmlformats.org/drawingml/2006/main" xmlns:r="http://schemas.openxmlformats.org/officeDocument/2006/relationships" xmlns:p="http://schemas.openxmlformats.org/presentationml/2006/main">
+  <p:cSld>
+    <p:spTree>
+      <p:nvGrpSpPr>
+        <p:cNvPr id="1" name=""/>
+        <p:cNvGrpSpPr/>
+        <p:nvPr/>
+      </p:nvGrpSpPr>
+      <p:grpSpPr>
+        <a:xfrm>
+          <a:off x="0" y="0"/>
+          <a:ext cx="0" cy="0"/>
+          <a:chOff x="0" y="0"/>
+          <a:chExt cx="0" cy="0"/>
+        </a:xfrm>
+      </p:grpSpPr>
+      <p:pic>
+        <p:nvPicPr>
+          <p:cNvPr id="2" name="Picture 1"/>
+          <p:cNvPicPr>
+            <a:picLocks noChangeAspect="1"/>
+          </p:cNvPicPr>
+          <p:nvPr/>
+        </p:nvPicPr>
+        <p:blipFill rotWithShape="1">
+          <a:blip r:embed="rId2" cstate="print">
+            <a:extLst>
+              <a:ext uri="{28A0092B-C50C-407E-A947-70E740481C1C}">
+                <a14:useLocalDpi xmlns:a14="http://schemas.microsoft.com/office/drawing/2010/main" val="0"/>
+              </a:ext>
+            </a:extLst>
+          </a:blip>
+          <a:srcRect/>
+          <a:stretch/>
+        </p:blipFill>
+        <p:spPr>
+          <a:xfrm>
+            <a:off x="1946787" y="1445342"/>
+            <a:ext cx="4787337" cy="2357401"/>
+          </a:xfrm>
+          <a:prstGeom prst="rect">
+            <a:avLst/>
+          </a:prstGeom>
+        </p:spPr>
+      </p:pic>
+    </p:spTree>
+    <p:extLst>
+      <p:ext uri="{BB962C8B-B14F-4D97-AF65-F5344CB8AC3E}">
+        <p14:creationId xmlns:p14="http://schemas.microsoft.com/office/powerpoint/2010/main" val="1054220511"/>
+      </p:ext>
+    </p:extLst>
+  </p:cSld>
+  <p:clrMapOvr>
+    <a:masterClrMapping/>
+  </p:clrMapOvr>
+</p:sld>
+</file>
+
+<file path=ppt/slides/slide9.xml><?xml version="1.0" encoding="utf-8"?>
+<p:sld xmlns:a="http://schemas.openxmlformats.org/drawingml/2006/main" xmlns:r="http://schemas.openxmlformats.org/officeDocument/2006/relationships" xmlns:p="http://schemas.openxmlformats.org/presentationml/2006/main">
+  <p:cSld>
+    <p:spTree>
+      <p:nvGrpSpPr>
+        <p:cNvPr id="1" name=""/>
+        <p:cNvGrpSpPr/>
+        <p:nvPr/>
+      </p:nvGrpSpPr>
+      <p:grpSpPr>
+        <a:xfrm>
+          <a:off x="0" y="0"/>
+          <a:ext cx="0" cy="0"/>
+          <a:chOff x="0" y="0"/>
+          <a:chExt cx="0" cy="0"/>
+        </a:xfrm>
+      </p:grpSpPr>
+      <p:pic>
+        <p:nvPicPr>
+          <p:cNvPr id="2" name="Picture 1"/>
+          <p:cNvPicPr>
+            <a:picLocks noChangeAspect="1"/>
+          </p:cNvPicPr>
+          <p:nvPr/>
+        </p:nvPicPr>
+        <p:blipFill rotWithShape="1">
+          <a:blip r:embed="rId2" cstate="screen">
+            <a:extLst>
+              <a:ext uri="{28A0092B-C50C-407E-A947-70E740481C1C}">
+                <a14:useLocalDpi xmlns:a14="http://schemas.microsoft.com/office/drawing/2010/main"/>
+              </a:ext>
+            </a:extLst>
+          </a:blip>
+          <a:srcRect/>
+          <a:stretch/>
+        </p:blipFill>
+        <p:spPr>
+          <a:xfrm>
+            <a:off x="1545769" y="1672770"/>
+            <a:ext cx="2902858" cy="2801257"/>
+          </a:xfrm>
+          <a:prstGeom prst="rect">
+            <a:avLst/>
+          </a:prstGeom>
+        </p:spPr>
+      </p:pic>
+      <p:pic>
+        <p:nvPicPr>
+          <p:cNvPr id="3" name="Picture 2"/>
+          <p:cNvPicPr>
+            <a:picLocks noChangeAspect="1"/>
+          </p:cNvPicPr>
+          <p:nvPr/>
+        </p:nvPicPr>
+        <p:blipFill rotWithShape="1">
+          <a:blip r:embed="rId3" cstate="screen">
+            <a:extLst>
+              <a:ext uri="{28A0092B-C50C-407E-A947-70E740481C1C}">
+                <a14:useLocalDpi xmlns:a14="http://schemas.microsoft.com/office/drawing/2010/main"/>
+              </a:ext>
+            </a:extLst>
+          </a:blip>
+          <a:srcRect/>
+          <a:stretch/>
+        </p:blipFill>
+        <p:spPr>
+          <a:xfrm>
+            <a:off x="7678056" y="1672770"/>
+            <a:ext cx="2767255" cy="2928259"/>
+          </a:xfrm>
+          <a:prstGeom prst="rect">
+            <a:avLst/>
+          </a:prstGeom>
+        </p:spPr>
+      </p:pic>
+      <p:pic>
+        <p:nvPicPr>
+          <p:cNvPr id="4" name="Picture 3"/>
+          <p:cNvPicPr>
+            <a:picLocks noChangeAspect="1"/>
+          </p:cNvPicPr>
+          <p:nvPr/>
+        </p:nvPicPr>
+        <p:blipFill rotWithShape="1">
+          <a:blip r:embed="rId4" cstate="screen">
+            <a:extLst>
+              <a:ext uri="{28A0092B-C50C-407E-A947-70E740481C1C}">
+                <a14:useLocalDpi xmlns:a14="http://schemas.microsoft.com/office/drawing/2010/main"/>
+              </a:ext>
+            </a:extLst>
+          </a:blip>
+          <a:srcRect/>
+          <a:stretch/>
+        </p:blipFill>
+        <p:spPr>
+          <a:xfrm>
+            <a:off x="4448627" y="1672770"/>
+            <a:ext cx="3065483" cy="2870201"/>
+          </a:xfrm>
+          <a:prstGeom prst="rect">
+            <a:avLst/>
+          </a:prstGeom>
+        </p:spPr>
+      </p:pic>
+    </p:spTree>
+    <p:extLst>
+      <p:ext uri="{BB962C8B-B14F-4D97-AF65-F5344CB8AC3E}">
+        <p14:creationId xmlns:p14="http://schemas.microsoft.com/office/powerpoint/2010/main" val="1144383578"/>
+      </p:ext>
+    </p:extLst>
+  </p:cSld>
+  <p:clrMapOvr>
+    <a:masterClrMapping/>
+  </p:clrMapOvr>
+</p:sld>
+</file>
+
 <file path=ppt/theme/theme1.xml><?xml version="1.0" encoding="utf-8"?>
 <a:theme xmlns:a="http://schemas.openxmlformats.org/drawingml/2006/main" name="Office Theme">
   <a:themeElements>

</xml_diff>